<commit_message>
some change to README
</commit_message>
<xml_diff>
--- a/resources/Diagrams.pptx
+++ b/resources/Diagrams.pptx
@@ -3482,7 +3482,7 @@
       </p:grpSpPr>
       <p:grpSp>
         <p:nvGrpSpPr>
-          <p:cNvPr id="2" name="Group 1"/>
+          <p:cNvPr id="5" name="Group 4"/>
           <p:cNvGrpSpPr/>
           <p:nvPr/>
         </p:nvGrpSpPr>
@@ -3494,608 +3494,887 @@
             <a:chExt cx="11138534" cy="4312589"/>
           </a:xfrm>
         </p:grpSpPr>
+        <p:grpSp>
+          <p:nvGrpSpPr>
+            <p:cNvPr id="2" name="Group 1"/>
+            <p:cNvGrpSpPr/>
+            <p:nvPr/>
+          </p:nvGrpSpPr>
+          <p:grpSpPr>
+            <a:xfrm>
+              <a:off x="770437" y="103092"/>
+              <a:ext cx="11138534" cy="4312589"/>
+              <a:chOff x="770437" y="103092"/>
+              <a:chExt cx="11138534" cy="4312589"/>
+            </a:xfrm>
+          </p:grpSpPr>
+          <p:sp>
+            <p:nvSpPr>
+              <p:cNvPr id="6" name="Rectangle 5"/>
+              <p:cNvSpPr/>
+              <p:nvPr/>
+            </p:nvSpPr>
+            <p:spPr bwMode="auto">
+              <a:xfrm>
+                <a:off x="770437" y="103092"/>
+                <a:ext cx="11138534" cy="4312589"/>
+              </a:xfrm>
+              <a:prstGeom prst="rect">
+                <a:avLst/>
+              </a:prstGeom>
+              <a:solidFill>
+                <a:schemeClr val="accent1">
+                  <a:lumMod val="20000"/>
+                  <a:lumOff val="80000"/>
+                </a:schemeClr>
+              </a:solidFill>
+              <a:ln>
+                <a:headEnd type="none" w="med" len="med"/>
+                <a:tailEnd type="none" w="med" len="med"/>
+              </a:ln>
+            </p:spPr>
+            <p:style>
+              <a:lnRef idx="1">
+                <a:schemeClr val="accent1"/>
+              </a:lnRef>
+              <a:fillRef idx="2">
+                <a:schemeClr val="accent1"/>
+              </a:fillRef>
+              <a:effectRef idx="1">
+                <a:schemeClr val="accent1"/>
+              </a:effectRef>
+              <a:fontRef idx="minor">
+                <a:schemeClr val="dk1"/>
+              </a:fontRef>
+            </p:style>
+            <p:txBody>
+              <a:bodyPr vert="horz" wrap="square" lIns="91440" tIns="45720" rIns="91440" bIns="45720" numCol="1" rtlCol="0" anchor="t" anchorCtr="0" compatLnSpc="1">
+                <a:prstTxWarp prst="textNoShape">
+                  <a:avLst/>
+                </a:prstTxWarp>
+                <a:noAutofit/>
+              </a:bodyPr>
+              <a:lstStyle/>
+              <a:p>
+                <a:pPr marL="342900" marR="0" indent="-342900" algn="l" defTabSz="914400" rtl="0" eaLnBrk="1" fontAlgn="base" latinLnBrk="0" hangingPunct="1">
+                  <a:lnSpc>
+                    <a:spcPct val="80000"/>
+                  </a:lnSpc>
+                  <a:spcBef>
+                    <a:spcPct val="20000"/>
+                  </a:spcBef>
+                  <a:spcAft>
+                    <a:spcPct val="0"/>
+                  </a:spcAft>
+                  <a:buClr>
+                    <a:schemeClr val="hlink"/>
+                  </a:buClr>
+                  <a:buSzPct val="60000"/>
+                  <a:buFont typeface="Arial Narrow" pitchFamily="34" charset="0"/>
+                  <a:buNone/>
+                  <a:tabLst/>
+                </a:pPr>
+                <a:endParaRPr kumimoji="0" lang="en-CA" sz="2000" i="0" u="none" strike="noStrike" cap="none" normalizeH="0" baseline="0" dirty="0" smtClean="0">
+                  <a:ln>
+                    <a:noFill/>
+                  </a:ln>
+                  <a:solidFill>
+                    <a:schemeClr val="tx1"/>
+                  </a:solidFill>
+                  <a:effectLst/>
+                  <a:latin typeface="Arial" charset="0"/>
+                </a:endParaRPr>
+              </a:p>
+            </p:txBody>
+          </p:sp>
+          <p:sp>
+            <p:nvSpPr>
+              <p:cNvPr id="9" name="Rectangle 8"/>
+              <p:cNvSpPr/>
+              <p:nvPr/>
+            </p:nvSpPr>
+            <p:spPr bwMode="auto">
+              <a:xfrm>
+                <a:off x="1985815" y="1200582"/>
+                <a:ext cx="2682778" cy="523321"/>
+              </a:xfrm>
+              <a:prstGeom prst="rect">
+                <a:avLst/>
+              </a:prstGeom>
+              <a:ln>
+                <a:headEnd type="none" w="med" len="med"/>
+                <a:tailEnd type="none" w="med" len="med"/>
+              </a:ln>
+            </p:spPr>
+            <p:style>
+              <a:lnRef idx="0">
+                <a:schemeClr val="accent6"/>
+              </a:lnRef>
+              <a:fillRef idx="3">
+                <a:schemeClr val="accent6"/>
+              </a:fillRef>
+              <a:effectRef idx="3">
+                <a:schemeClr val="accent6"/>
+              </a:effectRef>
+              <a:fontRef idx="minor">
+                <a:schemeClr val="lt1"/>
+              </a:fontRef>
+            </p:style>
+            <p:txBody>
+              <a:bodyPr vert="horz" wrap="none" lIns="91440" tIns="45720" rIns="91440" bIns="45720" numCol="1" rtlCol="0" anchor="ctr" anchorCtr="0" compatLnSpc="1">
+                <a:prstTxWarp prst="textNoShape">
+                  <a:avLst/>
+                </a:prstTxWarp>
+                <a:noAutofit/>
+              </a:bodyPr>
+              <a:lstStyle/>
+              <a:p>
+                <a:pPr marL="342900" indent="-342900" algn="ctr" fontAlgn="base">
+                  <a:lnSpc>
+                    <a:spcPct val="80000"/>
+                  </a:lnSpc>
+                  <a:spcBef>
+                    <a:spcPct val="20000"/>
+                  </a:spcBef>
+                  <a:spcAft>
+                    <a:spcPct val="0"/>
+                  </a:spcAft>
+                  <a:buClr>
+                    <a:schemeClr val="hlink"/>
+                  </a:buClr>
+                  <a:buSzPct val="60000"/>
+                </a:pPr>
+                <a:r>
+                  <a:rPr lang="en-CA" sz="2000" dirty="0" smtClean="0"/>
+                  <a:t>InputProxy</a:t>
+                </a:r>
+                <a:endParaRPr kumimoji="0" lang="en-CA" sz="2000" i="0" u="none" strike="noStrike" cap="none" normalizeH="0" baseline="0" dirty="0" smtClean="0">
+                  <a:ln>
+                    <a:noFill/>
+                  </a:ln>
+                  <a:solidFill>
+                    <a:schemeClr val="tx1"/>
+                  </a:solidFill>
+                  <a:effectLst/>
+                  <a:latin typeface="Arial" charset="0"/>
+                </a:endParaRPr>
+              </a:p>
+            </p:txBody>
+          </p:sp>
+          <p:cxnSp>
+            <p:nvCxnSpPr>
+              <p:cNvPr id="59" name="Straight Arrow Connector 58"/>
+              <p:cNvCxnSpPr/>
+              <p:nvPr/>
+            </p:nvCxnSpPr>
+            <p:spPr bwMode="auto">
+              <a:xfrm>
+                <a:off x="10784437" y="3176084"/>
+                <a:ext cx="914400" cy="914400"/>
+              </a:xfrm>
+              <a:prstGeom prst="straightConnector1">
+                <a:avLst/>
+              </a:prstGeom>
+              <a:noFill/>
+              <a:ln w="9525" cap="flat" cmpd="sng" algn="ctr">
+                <a:noFill/>
+                <a:prstDash val="solid"/>
+                <a:round/>
+                <a:headEnd type="none" w="med" len="med"/>
+                <a:tailEnd type="arrow"/>
+              </a:ln>
+              <a:effectLst/>
+            </p:spPr>
+          </p:cxnSp>
+          <p:sp>
+            <p:nvSpPr>
+              <p:cNvPr id="152" name="TextBox 151"/>
+              <p:cNvSpPr txBox="1"/>
+              <p:nvPr/>
+            </p:nvSpPr>
+            <p:spPr>
+              <a:xfrm>
+                <a:off x="996042" y="516493"/>
+                <a:ext cx="184731" cy="369332"/>
+              </a:xfrm>
+              <a:prstGeom prst="rect">
+                <a:avLst/>
+              </a:prstGeom>
+              <a:noFill/>
+            </p:spPr>
+            <p:txBody>
+              <a:bodyPr wrap="none" rtlCol="0">
+                <a:spAutoFit/>
+              </a:bodyPr>
+              <a:lstStyle/>
+              <a:p>
+                <a:endParaRPr lang="en-CA" dirty="0"/>
+              </a:p>
+            </p:txBody>
+          </p:sp>
+          <p:sp>
+            <p:nvSpPr>
+              <p:cNvPr id="165" name="TextBox 164"/>
+              <p:cNvSpPr txBox="1"/>
+              <p:nvPr/>
+            </p:nvSpPr>
+            <p:spPr>
+              <a:xfrm>
+                <a:off x="9482971" y="1828276"/>
+                <a:ext cx="1661173" cy="861774"/>
+              </a:xfrm>
+              <a:prstGeom prst="rect">
+                <a:avLst/>
+              </a:prstGeom>
+              <a:noFill/>
+            </p:spPr>
+            <p:txBody>
+              <a:bodyPr wrap="square" rtlCol="0">
+                <a:spAutoFit/>
+              </a:bodyPr>
+              <a:lstStyle/>
+              <a:p>
+                <a:r>
+                  <a:rPr lang="en-CA" sz="1600" dirty="0" smtClean="0"/>
+                  <a:t>Transport stream protocol </a:t>
+                </a:r>
+                <a:r>
+                  <a:rPr lang="en-CA" sz="1600" dirty="0"/>
+                  <a:t>a</a:t>
+                </a:r>
+                <a:r>
+                  <a:rPr lang="en-CA" sz="1600" dirty="0" smtClean="0"/>
+                  <a:t>gnostic</a:t>
+                </a:r>
+              </a:p>
+              <a:p>
+                <a:r>
+                  <a:rPr lang="en-CA" sz="1600" dirty="0" smtClean="0"/>
+                  <a:t>Solace messaging</a:t>
+                </a:r>
+              </a:p>
+            </p:txBody>
+          </p:sp>
+          <p:sp>
+            <p:nvSpPr>
+              <p:cNvPr id="79" name="TextBox 78"/>
+              <p:cNvSpPr txBox="1"/>
+              <p:nvPr/>
+            </p:nvSpPr>
+            <p:spPr>
+              <a:xfrm>
+                <a:off x="5837309" y="945897"/>
+                <a:ext cx="4025147" cy="338554"/>
+              </a:xfrm>
+              <a:prstGeom prst="rect">
+                <a:avLst/>
+              </a:prstGeom>
+              <a:noFill/>
+            </p:spPr>
+            <p:txBody>
+              <a:bodyPr wrap="square" rtlCol="0">
+                <a:spAutoFit/>
+              </a:bodyPr>
+              <a:lstStyle/>
+              <a:p>
+                <a:r>
+                  <a:rPr lang="en-CA" sz="1600" dirty="0" smtClean="0"/>
+                  <a:t>UDP, RTSP etc.</a:t>
+                </a:r>
+                <a:endParaRPr lang="en-CA" sz="1600" dirty="0"/>
+              </a:p>
+            </p:txBody>
+          </p:sp>
+          <p:sp>
+            <p:nvSpPr>
+              <p:cNvPr id="95" name="Rectangle 94"/>
+              <p:cNvSpPr/>
+              <p:nvPr/>
+            </p:nvSpPr>
+            <p:spPr bwMode="auto">
+              <a:xfrm>
+                <a:off x="1985815" y="1936300"/>
+                <a:ext cx="2682778" cy="523321"/>
+              </a:xfrm>
+              <a:prstGeom prst="rect">
+                <a:avLst/>
+              </a:prstGeom>
+              <a:ln>
+                <a:headEnd type="none" w="med" len="med"/>
+                <a:tailEnd type="none" w="med" len="med"/>
+              </a:ln>
+            </p:spPr>
+            <p:style>
+              <a:lnRef idx="0">
+                <a:schemeClr val="accent2"/>
+              </a:lnRef>
+              <a:fillRef idx="3">
+                <a:schemeClr val="accent2"/>
+              </a:fillRef>
+              <a:effectRef idx="3">
+                <a:schemeClr val="accent2"/>
+              </a:effectRef>
+              <a:fontRef idx="minor">
+                <a:schemeClr val="lt1"/>
+              </a:fontRef>
+            </p:style>
+            <p:txBody>
+              <a:bodyPr vert="horz" wrap="none" lIns="91440" tIns="45720" rIns="91440" bIns="45720" numCol="1" rtlCol="0" anchor="ctr" anchorCtr="0" compatLnSpc="1">
+                <a:prstTxWarp prst="textNoShape">
+                  <a:avLst/>
+                </a:prstTxWarp>
+                <a:noAutofit/>
+              </a:bodyPr>
+              <a:lstStyle/>
+              <a:p>
+                <a:pPr marL="342900" indent="-342900" algn="ctr" fontAlgn="base">
+                  <a:lnSpc>
+                    <a:spcPct val="80000"/>
+                  </a:lnSpc>
+                  <a:spcBef>
+                    <a:spcPct val="20000"/>
+                  </a:spcBef>
+                  <a:spcAft>
+                    <a:spcPct val="0"/>
+                  </a:spcAft>
+                  <a:buClr>
+                    <a:schemeClr val="hlink"/>
+                  </a:buClr>
+                  <a:buSzPct val="60000"/>
+                </a:pPr>
+                <a:r>
+                  <a:rPr lang="en-CA" sz="2000" dirty="0" smtClean="0"/>
+                  <a:t>Solace Message Router</a:t>
+                </a:r>
+              </a:p>
+            </p:txBody>
+          </p:sp>
+          <p:sp>
+            <p:nvSpPr>
+              <p:cNvPr id="25" name="Rectangle 24"/>
+              <p:cNvSpPr/>
+              <p:nvPr/>
+            </p:nvSpPr>
+            <p:spPr bwMode="auto">
+              <a:xfrm>
+                <a:off x="1985815" y="2668133"/>
+                <a:ext cx="2682778" cy="523321"/>
+              </a:xfrm>
+              <a:prstGeom prst="rect">
+                <a:avLst/>
+              </a:prstGeom>
+              <a:ln>
+                <a:headEnd type="none" w="med" len="med"/>
+                <a:tailEnd type="none" w="med" len="med"/>
+              </a:ln>
+            </p:spPr>
+            <p:style>
+              <a:lnRef idx="0">
+                <a:schemeClr val="accent6"/>
+              </a:lnRef>
+              <a:fillRef idx="3">
+                <a:schemeClr val="accent6"/>
+              </a:fillRef>
+              <a:effectRef idx="3">
+                <a:schemeClr val="accent6"/>
+              </a:effectRef>
+              <a:fontRef idx="minor">
+                <a:schemeClr val="lt1"/>
+              </a:fontRef>
+            </p:style>
+            <p:txBody>
+              <a:bodyPr vert="horz" wrap="none" lIns="91440" tIns="45720" rIns="91440" bIns="45720" numCol="1" rtlCol="0" anchor="ctr" anchorCtr="0" compatLnSpc="1">
+                <a:prstTxWarp prst="textNoShape">
+                  <a:avLst/>
+                </a:prstTxWarp>
+                <a:noAutofit/>
+              </a:bodyPr>
+              <a:lstStyle/>
+              <a:p>
+                <a:pPr marL="342900" indent="-342900" algn="ctr" fontAlgn="base">
+                  <a:lnSpc>
+                    <a:spcPct val="80000"/>
+                  </a:lnSpc>
+                  <a:spcBef>
+                    <a:spcPct val="20000"/>
+                  </a:spcBef>
+                  <a:spcAft>
+                    <a:spcPct val="0"/>
+                  </a:spcAft>
+                  <a:buClr>
+                    <a:schemeClr val="hlink"/>
+                  </a:buClr>
+                  <a:buSzPct val="60000"/>
+                </a:pPr>
+                <a:r>
+                  <a:rPr lang="en-CA" sz="2000" dirty="0" smtClean="0"/>
+                  <a:t>OutputProxy</a:t>
+                </a:r>
+                <a:endParaRPr kumimoji="0" lang="en-CA" sz="2000" i="0" u="none" strike="noStrike" cap="none" normalizeH="0" baseline="0" dirty="0" smtClean="0">
+                  <a:ln>
+                    <a:noFill/>
+                  </a:ln>
+                  <a:solidFill>
+                    <a:schemeClr val="tx1"/>
+                  </a:solidFill>
+                  <a:effectLst/>
+                  <a:latin typeface="Arial" charset="0"/>
+                </a:endParaRPr>
+              </a:p>
+            </p:txBody>
+          </p:sp>
+          <p:sp>
+            <p:nvSpPr>
+              <p:cNvPr id="26" name="Rectangle 25"/>
+              <p:cNvSpPr/>
+              <p:nvPr/>
+            </p:nvSpPr>
+            <p:spPr bwMode="auto">
+              <a:xfrm>
+                <a:off x="1985815" y="472206"/>
+                <a:ext cx="2682778" cy="523321"/>
+              </a:xfrm>
+              <a:prstGeom prst="rect">
+                <a:avLst/>
+              </a:prstGeom>
+              <a:solidFill>
+                <a:schemeClr val="accent1">
+                  <a:lumMod val="75000"/>
+                </a:schemeClr>
+              </a:solidFill>
+              <a:ln>
+                <a:headEnd type="none" w="med" len="med"/>
+                <a:tailEnd type="none" w="med" len="med"/>
+              </a:ln>
+            </p:spPr>
+            <p:style>
+              <a:lnRef idx="0">
+                <a:schemeClr val="accent6"/>
+              </a:lnRef>
+              <a:fillRef idx="3">
+                <a:schemeClr val="accent6"/>
+              </a:fillRef>
+              <a:effectRef idx="3">
+                <a:schemeClr val="accent6"/>
+              </a:effectRef>
+              <a:fontRef idx="minor">
+                <a:schemeClr val="lt1"/>
+              </a:fontRef>
+            </p:style>
+            <p:txBody>
+              <a:bodyPr vert="horz" wrap="none" lIns="91440" tIns="45720" rIns="91440" bIns="45720" numCol="1" rtlCol="0" anchor="ctr" anchorCtr="0" compatLnSpc="1">
+                <a:prstTxWarp prst="textNoShape">
+                  <a:avLst/>
+                </a:prstTxWarp>
+                <a:noAutofit/>
+              </a:bodyPr>
+              <a:lstStyle/>
+              <a:p>
+                <a:pPr marL="342900" indent="-342900" algn="ctr" fontAlgn="base">
+                  <a:lnSpc>
+                    <a:spcPct val="80000"/>
+                  </a:lnSpc>
+                  <a:spcBef>
+                    <a:spcPct val="20000"/>
+                  </a:spcBef>
+                  <a:spcAft>
+                    <a:spcPct val="0"/>
+                  </a:spcAft>
+                  <a:buClr>
+                    <a:schemeClr val="hlink"/>
+                  </a:buClr>
+                  <a:buSzPct val="60000"/>
+                </a:pPr>
+                <a:r>
+                  <a:rPr lang="en-CA" sz="2000" dirty="0" smtClean="0"/>
+                  <a:t>Live Source</a:t>
+                </a:r>
+                <a:endParaRPr kumimoji="0" lang="en-CA" sz="2000" i="0" u="none" strike="noStrike" cap="none" normalizeH="0" baseline="0" dirty="0" smtClean="0">
+                  <a:ln>
+                    <a:noFill/>
+                  </a:ln>
+                  <a:solidFill>
+                    <a:schemeClr val="tx1"/>
+                  </a:solidFill>
+                  <a:effectLst/>
+                  <a:latin typeface="Arial" charset="0"/>
+                </a:endParaRPr>
+              </a:p>
+            </p:txBody>
+          </p:sp>
+          <p:sp>
+            <p:nvSpPr>
+              <p:cNvPr id="27" name="Rectangle 26"/>
+              <p:cNvSpPr/>
+              <p:nvPr/>
+            </p:nvSpPr>
+            <p:spPr bwMode="auto">
+              <a:xfrm>
+                <a:off x="1985815" y="3399984"/>
+                <a:ext cx="2682778" cy="523321"/>
+              </a:xfrm>
+              <a:prstGeom prst="rect">
+                <a:avLst/>
+              </a:prstGeom>
+              <a:solidFill>
+                <a:schemeClr val="accent1">
+                  <a:lumMod val="75000"/>
+                </a:schemeClr>
+              </a:solidFill>
+              <a:ln>
+                <a:headEnd type="none" w="med" len="med"/>
+                <a:tailEnd type="none" w="med" len="med"/>
+              </a:ln>
+            </p:spPr>
+            <p:style>
+              <a:lnRef idx="0">
+                <a:schemeClr val="accent6"/>
+              </a:lnRef>
+              <a:fillRef idx="3">
+                <a:schemeClr val="accent6"/>
+              </a:fillRef>
+              <a:effectRef idx="3">
+                <a:schemeClr val="accent6"/>
+              </a:effectRef>
+              <a:fontRef idx="minor">
+                <a:schemeClr val="lt1"/>
+              </a:fontRef>
+            </p:style>
+            <p:txBody>
+              <a:bodyPr vert="horz" wrap="none" lIns="91440" tIns="45720" rIns="91440" bIns="45720" numCol="1" rtlCol="0" anchor="ctr" anchorCtr="0" compatLnSpc="1">
+                <a:prstTxWarp prst="textNoShape">
+                  <a:avLst/>
+                </a:prstTxWarp>
+                <a:noAutofit/>
+              </a:bodyPr>
+              <a:lstStyle/>
+              <a:p>
+                <a:pPr marL="342900" indent="-342900" algn="ctr" fontAlgn="base">
+                  <a:lnSpc>
+                    <a:spcPct val="80000"/>
+                  </a:lnSpc>
+                  <a:spcBef>
+                    <a:spcPct val="20000"/>
+                  </a:spcBef>
+                  <a:spcAft>
+                    <a:spcPct val="0"/>
+                  </a:spcAft>
+                  <a:buClr>
+                    <a:schemeClr val="hlink"/>
+                  </a:buClr>
+                  <a:buSzPct val="60000"/>
+                </a:pPr>
+                <a:r>
+                  <a:rPr lang="en-CA" sz="2000" smtClean="0"/>
+                  <a:t>Receiving Device</a:t>
+                </a:r>
+                <a:endParaRPr kumimoji="0" lang="en-CA" sz="2000" i="0" u="none" strike="noStrike" cap="none" normalizeH="0" baseline="0" dirty="0" smtClean="0">
+                  <a:ln>
+                    <a:noFill/>
+                  </a:ln>
+                  <a:solidFill>
+                    <a:schemeClr val="tx1"/>
+                  </a:solidFill>
+                  <a:effectLst/>
+                  <a:latin typeface="Arial" charset="0"/>
+                </a:endParaRPr>
+              </a:p>
+            </p:txBody>
+          </p:sp>
+          <p:sp>
+            <p:nvSpPr>
+              <p:cNvPr id="11" name="U-Turn Arrow 10"/>
+              <p:cNvSpPr/>
+              <p:nvPr/>
+            </p:nvSpPr>
+            <p:spPr>
+              <a:xfrm rot="5400000">
+                <a:off x="4831228" y="2288234"/>
+                <a:ext cx="727642" cy="751114"/>
+              </a:xfrm>
+              <a:prstGeom prst="uturnArrow">
+                <a:avLst/>
+              </a:prstGeom>
+            </p:spPr>
+            <p:style>
+              <a:lnRef idx="2">
+                <a:schemeClr val="accent1">
+                  <a:shade val="50000"/>
+                </a:schemeClr>
+              </a:lnRef>
+              <a:fillRef idx="1">
+                <a:schemeClr val="accent1"/>
+              </a:fillRef>
+              <a:effectRef idx="0">
+                <a:schemeClr val="accent1"/>
+              </a:effectRef>
+              <a:fontRef idx="minor">
+                <a:schemeClr val="lt1"/>
+              </a:fontRef>
+            </p:style>
+            <p:txBody>
+              <a:bodyPr rtlCol="0" anchor="ctr"/>
+              <a:lstStyle/>
+              <a:p>
+                <a:pPr algn="ctr"/>
+                <a:endParaRPr lang="en-US">
+                  <a:solidFill>
+                    <a:schemeClr val="tx1"/>
+                  </a:solidFill>
+                </a:endParaRPr>
+              </a:p>
+            </p:txBody>
+          </p:sp>
+          <p:sp>
+            <p:nvSpPr>
+              <p:cNvPr id="35" name="U-Turn Arrow 34"/>
+              <p:cNvSpPr/>
+              <p:nvPr/>
+            </p:nvSpPr>
+            <p:spPr>
+              <a:xfrm rot="5400000">
+                <a:off x="4831228" y="3058358"/>
+                <a:ext cx="727642" cy="751114"/>
+              </a:xfrm>
+              <a:prstGeom prst="uturnArrow">
+                <a:avLst/>
+              </a:prstGeom>
+            </p:spPr>
+            <p:style>
+              <a:lnRef idx="2">
+                <a:schemeClr val="accent1">
+                  <a:shade val="50000"/>
+                </a:schemeClr>
+              </a:lnRef>
+              <a:fillRef idx="1">
+                <a:schemeClr val="accent1"/>
+              </a:fillRef>
+              <a:effectRef idx="0">
+                <a:schemeClr val="accent1"/>
+              </a:effectRef>
+              <a:fontRef idx="minor">
+                <a:schemeClr val="lt1"/>
+              </a:fontRef>
+            </p:style>
+            <p:txBody>
+              <a:bodyPr rtlCol="0" anchor="ctr"/>
+              <a:lstStyle/>
+              <a:p>
+                <a:pPr algn="ctr"/>
+                <a:endParaRPr lang="en-US">
+                  <a:solidFill>
+                    <a:schemeClr val="tx1"/>
+                  </a:solidFill>
+                </a:endParaRPr>
+              </a:p>
+            </p:txBody>
+          </p:sp>
+          <p:sp>
+            <p:nvSpPr>
+              <p:cNvPr id="36" name="U-Turn Arrow 35"/>
+              <p:cNvSpPr/>
+              <p:nvPr/>
+            </p:nvSpPr>
+            <p:spPr>
+              <a:xfrm rot="5400000">
+                <a:off x="4811848" y="1520009"/>
+                <a:ext cx="727642" cy="751114"/>
+              </a:xfrm>
+              <a:prstGeom prst="uturnArrow">
+                <a:avLst/>
+              </a:prstGeom>
+            </p:spPr>
+            <p:style>
+              <a:lnRef idx="2">
+                <a:schemeClr val="accent1">
+                  <a:shade val="50000"/>
+                </a:schemeClr>
+              </a:lnRef>
+              <a:fillRef idx="1">
+                <a:schemeClr val="accent1"/>
+              </a:fillRef>
+              <a:effectRef idx="0">
+                <a:schemeClr val="accent1"/>
+              </a:effectRef>
+              <a:fontRef idx="minor">
+                <a:schemeClr val="lt1"/>
+              </a:fontRef>
+            </p:style>
+            <p:txBody>
+              <a:bodyPr rtlCol="0" anchor="ctr"/>
+              <a:lstStyle/>
+              <a:p>
+                <a:pPr algn="ctr"/>
+                <a:endParaRPr lang="en-US">
+                  <a:solidFill>
+                    <a:schemeClr val="tx1"/>
+                  </a:solidFill>
+                </a:endParaRPr>
+              </a:p>
+            </p:txBody>
+          </p:sp>
+          <p:sp>
+            <p:nvSpPr>
+              <p:cNvPr id="37" name="U-Turn Arrow 36"/>
+              <p:cNvSpPr/>
+              <p:nvPr/>
+            </p:nvSpPr>
+            <p:spPr>
+              <a:xfrm rot="5400000">
+                <a:off x="4798435" y="755006"/>
+                <a:ext cx="727642" cy="751114"/>
+              </a:xfrm>
+              <a:prstGeom prst="uturnArrow">
+                <a:avLst/>
+              </a:prstGeom>
+            </p:spPr>
+            <p:style>
+              <a:lnRef idx="2">
+                <a:schemeClr val="accent1">
+                  <a:shade val="50000"/>
+                </a:schemeClr>
+              </a:lnRef>
+              <a:fillRef idx="1">
+                <a:schemeClr val="accent1"/>
+              </a:fillRef>
+              <a:effectRef idx="0">
+                <a:schemeClr val="accent1"/>
+              </a:effectRef>
+              <a:fontRef idx="minor">
+                <a:schemeClr val="lt1"/>
+              </a:fontRef>
+            </p:style>
+            <p:txBody>
+              <a:bodyPr rtlCol="0" anchor="ctr"/>
+              <a:lstStyle/>
+              <a:p>
+                <a:pPr algn="ctr"/>
+                <a:endParaRPr lang="en-US">
+                  <a:solidFill>
+                    <a:schemeClr val="tx1"/>
+                  </a:solidFill>
+                </a:endParaRPr>
+              </a:p>
+            </p:txBody>
+          </p:sp>
+          <p:sp>
+            <p:nvSpPr>
+              <p:cNvPr id="38" name="TextBox 37"/>
+              <p:cNvSpPr txBox="1"/>
+              <p:nvPr/>
+            </p:nvSpPr>
+            <p:spPr>
+              <a:xfrm>
+                <a:off x="5837306" y="1690883"/>
+                <a:ext cx="4025147" cy="338554"/>
+              </a:xfrm>
+              <a:prstGeom prst="rect">
+                <a:avLst/>
+              </a:prstGeom>
+              <a:noFill/>
+            </p:spPr>
+            <p:txBody>
+              <a:bodyPr wrap="square" rtlCol="0">
+                <a:spAutoFit/>
+              </a:bodyPr>
+              <a:lstStyle/>
+              <a:p>
+                <a:r>
+                  <a:rPr lang="en-CA" sz="1600" dirty="0" smtClean="0"/>
+                  <a:t>SMF encapsulated UDP, RTSP etc.</a:t>
+                </a:r>
+                <a:endParaRPr lang="en-CA" sz="1600" dirty="0"/>
+              </a:p>
+            </p:txBody>
+          </p:sp>
+          <p:sp>
+            <p:nvSpPr>
+              <p:cNvPr id="39" name="TextBox 38"/>
+              <p:cNvSpPr txBox="1"/>
+              <p:nvPr/>
+            </p:nvSpPr>
+            <p:spPr>
+              <a:xfrm>
+                <a:off x="5835940" y="2460608"/>
+                <a:ext cx="4025147" cy="338554"/>
+              </a:xfrm>
+              <a:prstGeom prst="rect">
+                <a:avLst/>
+              </a:prstGeom>
+              <a:noFill/>
+            </p:spPr>
+            <p:txBody>
+              <a:bodyPr wrap="square" rtlCol="0">
+                <a:spAutoFit/>
+              </a:bodyPr>
+              <a:lstStyle/>
+              <a:p>
+                <a:r>
+                  <a:rPr lang="en-CA" sz="1600" dirty="0" smtClean="0"/>
+                  <a:t>SMF encapsulated UDP, RTSP etc.</a:t>
+                </a:r>
+                <a:endParaRPr lang="en-CA" sz="1600" dirty="0"/>
+              </a:p>
+            </p:txBody>
+          </p:sp>
+          <p:sp>
+            <p:nvSpPr>
+              <p:cNvPr id="40" name="TextBox 39"/>
+              <p:cNvSpPr txBox="1"/>
+              <p:nvPr/>
+            </p:nvSpPr>
+            <p:spPr>
+              <a:xfrm>
+                <a:off x="5835941" y="3170285"/>
+                <a:ext cx="4025147" cy="338554"/>
+              </a:xfrm>
+              <a:prstGeom prst="rect">
+                <a:avLst/>
+              </a:prstGeom>
+              <a:noFill/>
+            </p:spPr>
+            <p:txBody>
+              <a:bodyPr wrap="square" rtlCol="0">
+                <a:spAutoFit/>
+              </a:bodyPr>
+              <a:lstStyle/>
+              <a:p>
+                <a:r>
+                  <a:rPr lang="en-CA" sz="1600" dirty="0" smtClean="0"/>
+                  <a:t>UDP, RTSP etc.</a:t>
+                </a:r>
+                <a:endParaRPr lang="en-CA" sz="1600" dirty="0"/>
+              </a:p>
+            </p:txBody>
+          </p:sp>
+        </p:grpSp>
         <p:sp>
           <p:nvSpPr>
-            <p:cNvPr id="6" name="Rectangle 5"/>
+            <p:cNvPr id="4" name="Right Brace 3"/>
             <p:cNvSpPr/>
             <p:nvPr/>
           </p:nvSpPr>
-          <p:spPr bwMode="auto">
+          <p:spPr>
             <a:xfrm>
-              <a:off x="770437" y="103092"/>
-              <a:ext cx="11138534" cy="4312589"/>
+              <a:off x="9089571" y="1789219"/>
+              <a:ext cx="250372" cy="939888"/>
             </a:xfrm>
-            <a:prstGeom prst="rect">
+            <a:prstGeom prst="rightBrace">
               <a:avLst/>
             </a:prstGeom>
-            <a:solidFill>
-              <a:schemeClr val="accent1">
-                <a:lumMod val="20000"/>
-                <a:lumOff val="80000"/>
-              </a:schemeClr>
-            </a:solidFill>
-            <a:ln>
-              <a:headEnd type="none" w="med" len="med"/>
-              <a:tailEnd type="none" w="med" len="med"/>
-            </a:ln>
           </p:spPr>
           <p:style>
             <a:lnRef idx="1">
               <a:schemeClr val="accent1"/>
             </a:lnRef>
-            <a:fillRef idx="2">
-              <a:schemeClr val="accent1"/>
-            </a:fillRef>
-            <a:effectRef idx="1">
-              <a:schemeClr val="accent1"/>
-            </a:effectRef>
-            <a:fontRef idx="minor">
-              <a:schemeClr val="dk1"/>
-            </a:fontRef>
-          </p:style>
-          <p:txBody>
-            <a:bodyPr vert="horz" wrap="square" lIns="91440" tIns="45720" rIns="91440" bIns="45720" numCol="1" rtlCol="0" anchor="t" anchorCtr="0" compatLnSpc="1">
-              <a:prstTxWarp prst="textNoShape">
-                <a:avLst/>
-              </a:prstTxWarp>
-              <a:noAutofit/>
-            </a:bodyPr>
-            <a:lstStyle/>
-            <a:p>
-              <a:pPr marL="342900" marR="0" indent="-342900" algn="l" defTabSz="914400" rtl="0" eaLnBrk="1" fontAlgn="base" latinLnBrk="0" hangingPunct="1">
-                <a:lnSpc>
-                  <a:spcPct val="80000"/>
-                </a:lnSpc>
-                <a:spcBef>
-                  <a:spcPct val="20000"/>
-                </a:spcBef>
-                <a:spcAft>
-                  <a:spcPct val="0"/>
-                </a:spcAft>
-                <a:buClr>
-                  <a:schemeClr val="hlink"/>
-                </a:buClr>
-                <a:buSzPct val="60000"/>
-                <a:buFont typeface="Arial Narrow" pitchFamily="34" charset="0"/>
-                <a:buNone/>
-                <a:tabLst/>
-              </a:pPr>
-              <a:endParaRPr kumimoji="0" lang="en-CA" sz="2000" i="0" u="none" strike="noStrike" cap="none" normalizeH="0" baseline="0" dirty="0" smtClean="0">
-                <a:ln>
-                  <a:noFill/>
-                </a:ln>
-                <a:solidFill>
-                  <a:schemeClr val="tx1"/>
-                </a:solidFill>
-                <a:effectLst/>
-                <a:latin typeface="Arial" charset="0"/>
-              </a:endParaRPr>
-            </a:p>
-          </p:txBody>
-        </p:sp>
-        <p:sp>
-          <p:nvSpPr>
-            <p:cNvPr id="9" name="Rectangle 8"/>
-            <p:cNvSpPr/>
-            <p:nvPr/>
-          </p:nvSpPr>
-          <p:spPr bwMode="auto">
-            <a:xfrm>
-              <a:off x="1985815" y="1200582"/>
-              <a:ext cx="2682778" cy="523321"/>
-            </a:xfrm>
-            <a:prstGeom prst="rect">
-              <a:avLst/>
-            </a:prstGeom>
-            <a:ln>
-              <a:headEnd type="none" w="med" len="med"/>
-              <a:tailEnd type="none" w="med" len="med"/>
-            </a:ln>
-          </p:spPr>
-          <p:style>
-            <a:lnRef idx="0">
-              <a:schemeClr val="accent6"/>
-            </a:lnRef>
-            <a:fillRef idx="3">
-              <a:schemeClr val="accent6"/>
-            </a:fillRef>
-            <a:effectRef idx="3">
-              <a:schemeClr val="accent6"/>
-            </a:effectRef>
-            <a:fontRef idx="minor">
-              <a:schemeClr val="lt1"/>
-            </a:fontRef>
-          </p:style>
-          <p:txBody>
-            <a:bodyPr vert="horz" wrap="none" lIns="91440" tIns="45720" rIns="91440" bIns="45720" numCol="1" rtlCol="0" anchor="ctr" anchorCtr="0" compatLnSpc="1">
-              <a:prstTxWarp prst="textNoShape">
-                <a:avLst/>
-              </a:prstTxWarp>
-              <a:noAutofit/>
-            </a:bodyPr>
-            <a:lstStyle/>
-            <a:p>
-              <a:pPr marL="342900" indent="-342900" algn="ctr" fontAlgn="base">
-                <a:lnSpc>
-                  <a:spcPct val="80000"/>
-                </a:lnSpc>
-                <a:spcBef>
-                  <a:spcPct val="20000"/>
-                </a:spcBef>
-                <a:spcAft>
-                  <a:spcPct val="0"/>
-                </a:spcAft>
-                <a:buClr>
-                  <a:schemeClr val="hlink"/>
-                </a:buClr>
-                <a:buSzPct val="60000"/>
-              </a:pPr>
-              <a:r>
-                <a:rPr lang="en-CA" sz="2000" dirty="0" err="1" smtClean="0"/>
-                <a:t>InputProxy</a:t>
-              </a:r>
-              <a:endParaRPr kumimoji="0" lang="en-CA" sz="2000" i="0" u="none" strike="noStrike" cap="none" normalizeH="0" baseline="0" dirty="0" smtClean="0">
-                <a:ln>
-                  <a:noFill/>
-                </a:ln>
-                <a:solidFill>
-                  <a:schemeClr val="tx1"/>
-                </a:solidFill>
-                <a:effectLst/>
-                <a:latin typeface="Arial" charset="0"/>
-              </a:endParaRPr>
-            </a:p>
-          </p:txBody>
-        </p:sp>
-        <p:cxnSp>
-          <p:nvCxnSpPr>
-            <p:cNvPr id="59" name="Straight Arrow Connector 58"/>
-            <p:cNvCxnSpPr/>
-            <p:nvPr/>
-          </p:nvCxnSpPr>
-          <p:spPr bwMode="auto">
-            <a:xfrm>
-              <a:off x="10784437" y="3176084"/>
-              <a:ext cx="914400" cy="914400"/>
-            </a:xfrm>
-            <a:prstGeom prst="straightConnector1">
-              <a:avLst/>
-            </a:prstGeom>
-            <a:noFill/>
-            <a:ln w="9525" cap="flat" cmpd="sng" algn="ctr">
-              <a:noFill/>
-              <a:prstDash val="solid"/>
-              <a:round/>
-              <a:headEnd type="none" w="med" len="med"/>
-              <a:tailEnd type="arrow"/>
-            </a:ln>
-            <a:effectLst/>
-          </p:spPr>
-        </p:cxnSp>
-        <p:sp>
-          <p:nvSpPr>
-            <p:cNvPr id="152" name="TextBox 151"/>
-            <p:cNvSpPr txBox="1"/>
-            <p:nvPr/>
-          </p:nvSpPr>
-          <p:spPr>
-            <a:xfrm>
-              <a:off x="996042" y="516493"/>
-              <a:ext cx="184731" cy="369332"/>
-            </a:xfrm>
-            <a:prstGeom prst="rect">
-              <a:avLst/>
-            </a:prstGeom>
-            <a:noFill/>
-          </p:spPr>
-          <p:txBody>
-            <a:bodyPr wrap="none" rtlCol="0">
-              <a:spAutoFit/>
-            </a:bodyPr>
-            <a:lstStyle/>
-            <a:p>
-              <a:endParaRPr lang="en-CA" dirty="0"/>
-            </a:p>
-          </p:txBody>
-        </p:sp>
-        <p:sp>
-          <p:nvSpPr>
-            <p:cNvPr id="165" name="TextBox 164"/>
-            <p:cNvSpPr txBox="1"/>
-            <p:nvPr/>
-          </p:nvSpPr>
-          <p:spPr>
-            <a:xfrm>
-              <a:off x="9482971" y="1828276"/>
-              <a:ext cx="1661173" cy="861774"/>
-            </a:xfrm>
-            <a:prstGeom prst="rect">
-              <a:avLst/>
-            </a:prstGeom>
-            <a:noFill/>
-          </p:spPr>
-          <p:txBody>
-            <a:bodyPr wrap="square" rtlCol="0">
-              <a:spAutoFit/>
-            </a:bodyPr>
-            <a:lstStyle/>
-            <a:p>
-              <a:r>
-                <a:rPr lang="en-CA" sz="1600" dirty="0" smtClean="0"/>
-                <a:t>Transport stream protocol </a:t>
-              </a:r>
-              <a:r>
-                <a:rPr lang="en-CA" sz="1600" dirty="0"/>
-                <a:t>a</a:t>
-              </a:r>
-              <a:r>
-                <a:rPr lang="en-CA" sz="1600" dirty="0" smtClean="0"/>
-                <a:t>gnostic</a:t>
-              </a:r>
-            </a:p>
-            <a:p>
-              <a:r>
-                <a:rPr lang="en-CA" sz="1600" dirty="0" smtClean="0"/>
-                <a:t>Solace messaging</a:t>
-              </a:r>
-            </a:p>
-          </p:txBody>
-        </p:sp>
-        <p:sp>
-          <p:nvSpPr>
-            <p:cNvPr id="79" name="TextBox 78"/>
-            <p:cNvSpPr txBox="1"/>
-            <p:nvPr/>
-          </p:nvSpPr>
-          <p:spPr>
-            <a:xfrm>
-              <a:off x="5837309" y="945897"/>
-              <a:ext cx="4025147" cy="338554"/>
-            </a:xfrm>
-            <a:prstGeom prst="rect">
-              <a:avLst/>
-            </a:prstGeom>
-            <a:noFill/>
-          </p:spPr>
-          <p:txBody>
-            <a:bodyPr wrap="square" rtlCol="0">
-              <a:spAutoFit/>
-            </a:bodyPr>
-            <a:lstStyle/>
-            <a:p>
-              <a:r>
-                <a:rPr lang="en-CA" sz="1600" dirty="0" smtClean="0"/>
-                <a:t>UDP, RTSP etc.</a:t>
-              </a:r>
-              <a:endParaRPr lang="en-CA" sz="1600" dirty="0"/>
-            </a:p>
-          </p:txBody>
-        </p:sp>
-        <p:sp>
-          <p:nvSpPr>
-            <p:cNvPr id="95" name="Rectangle 94"/>
-            <p:cNvSpPr/>
-            <p:nvPr/>
-          </p:nvSpPr>
-          <p:spPr bwMode="auto">
-            <a:xfrm>
-              <a:off x="1985815" y="1936300"/>
-              <a:ext cx="2682778" cy="523321"/>
-            </a:xfrm>
-            <a:prstGeom prst="rect">
-              <a:avLst/>
-            </a:prstGeom>
-            <a:ln>
-              <a:headEnd type="none" w="med" len="med"/>
-              <a:tailEnd type="none" w="med" len="med"/>
-            </a:ln>
-          </p:spPr>
-          <p:style>
-            <a:lnRef idx="0">
-              <a:schemeClr val="accent2"/>
-            </a:lnRef>
-            <a:fillRef idx="3">
-              <a:schemeClr val="accent2"/>
-            </a:fillRef>
-            <a:effectRef idx="3">
-              <a:schemeClr val="accent2"/>
-            </a:effectRef>
-            <a:fontRef idx="minor">
-              <a:schemeClr val="lt1"/>
-            </a:fontRef>
-          </p:style>
-          <p:txBody>
-            <a:bodyPr vert="horz" wrap="none" lIns="91440" tIns="45720" rIns="91440" bIns="45720" numCol="1" rtlCol="0" anchor="ctr" anchorCtr="0" compatLnSpc="1">
-              <a:prstTxWarp prst="textNoShape">
-                <a:avLst/>
-              </a:prstTxWarp>
-              <a:noAutofit/>
-            </a:bodyPr>
-            <a:lstStyle/>
-            <a:p>
-              <a:pPr marL="342900" indent="-342900" algn="ctr" fontAlgn="base">
-                <a:lnSpc>
-                  <a:spcPct val="80000"/>
-                </a:lnSpc>
-                <a:spcBef>
-                  <a:spcPct val="20000"/>
-                </a:spcBef>
-                <a:spcAft>
-                  <a:spcPct val="0"/>
-                </a:spcAft>
-                <a:buClr>
-                  <a:schemeClr val="hlink"/>
-                </a:buClr>
-                <a:buSzPct val="60000"/>
-              </a:pPr>
-              <a:r>
-                <a:rPr lang="en-CA" sz="2000" dirty="0" smtClean="0"/>
-                <a:t>Solace Message Router</a:t>
-              </a:r>
-            </a:p>
-          </p:txBody>
-        </p:sp>
-        <p:sp>
-          <p:nvSpPr>
-            <p:cNvPr id="25" name="Rectangle 24"/>
-            <p:cNvSpPr/>
-            <p:nvPr/>
-          </p:nvSpPr>
-          <p:spPr bwMode="auto">
-            <a:xfrm>
-              <a:off x="1985815" y="2668133"/>
-              <a:ext cx="2682778" cy="523321"/>
-            </a:xfrm>
-            <a:prstGeom prst="rect">
-              <a:avLst/>
-            </a:prstGeom>
-            <a:ln>
-              <a:headEnd type="none" w="med" len="med"/>
-              <a:tailEnd type="none" w="med" len="med"/>
-            </a:ln>
-          </p:spPr>
-          <p:style>
-            <a:lnRef idx="0">
-              <a:schemeClr val="accent6"/>
-            </a:lnRef>
-            <a:fillRef idx="3">
-              <a:schemeClr val="accent6"/>
-            </a:fillRef>
-            <a:effectRef idx="3">
-              <a:schemeClr val="accent6"/>
-            </a:effectRef>
-            <a:fontRef idx="minor">
-              <a:schemeClr val="lt1"/>
-            </a:fontRef>
-          </p:style>
-          <p:txBody>
-            <a:bodyPr vert="horz" wrap="none" lIns="91440" tIns="45720" rIns="91440" bIns="45720" numCol="1" rtlCol="0" anchor="ctr" anchorCtr="0" compatLnSpc="1">
-              <a:prstTxWarp prst="textNoShape">
-                <a:avLst/>
-              </a:prstTxWarp>
-              <a:noAutofit/>
-            </a:bodyPr>
-            <a:lstStyle/>
-            <a:p>
-              <a:pPr marL="342900" indent="-342900" algn="ctr" fontAlgn="base">
-                <a:lnSpc>
-                  <a:spcPct val="80000"/>
-                </a:lnSpc>
-                <a:spcBef>
-                  <a:spcPct val="20000"/>
-                </a:spcBef>
-                <a:spcAft>
-                  <a:spcPct val="0"/>
-                </a:spcAft>
-                <a:buClr>
-                  <a:schemeClr val="hlink"/>
-                </a:buClr>
-                <a:buSzPct val="60000"/>
-              </a:pPr>
-              <a:r>
-                <a:rPr lang="en-CA" sz="2000" dirty="0" err="1" smtClean="0"/>
-                <a:t>OutputProxy</a:t>
-              </a:r>
-              <a:endParaRPr kumimoji="0" lang="en-CA" sz="2000" i="0" u="none" strike="noStrike" cap="none" normalizeH="0" baseline="0" dirty="0" smtClean="0">
-                <a:ln>
-                  <a:noFill/>
-                </a:ln>
-                <a:solidFill>
-                  <a:schemeClr val="tx1"/>
-                </a:solidFill>
-                <a:effectLst/>
-                <a:latin typeface="Arial" charset="0"/>
-              </a:endParaRPr>
-            </a:p>
-          </p:txBody>
-        </p:sp>
-        <p:sp>
-          <p:nvSpPr>
-            <p:cNvPr id="26" name="Rectangle 25"/>
-            <p:cNvSpPr/>
-            <p:nvPr/>
-          </p:nvSpPr>
-          <p:spPr bwMode="auto">
-            <a:xfrm>
-              <a:off x="1985815" y="472206"/>
-              <a:ext cx="2682778" cy="523321"/>
-            </a:xfrm>
-            <a:prstGeom prst="rect">
-              <a:avLst/>
-            </a:prstGeom>
-            <a:solidFill>
-              <a:schemeClr val="accent1">
-                <a:lumMod val="75000"/>
-              </a:schemeClr>
-            </a:solidFill>
-            <a:ln>
-              <a:headEnd type="none" w="med" len="med"/>
-              <a:tailEnd type="none" w="med" len="med"/>
-            </a:ln>
-          </p:spPr>
-          <p:style>
-            <a:lnRef idx="0">
-              <a:schemeClr val="accent6"/>
-            </a:lnRef>
-            <a:fillRef idx="3">
-              <a:schemeClr val="accent6"/>
-            </a:fillRef>
-            <a:effectRef idx="3">
-              <a:schemeClr val="accent6"/>
-            </a:effectRef>
-            <a:fontRef idx="minor">
-              <a:schemeClr val="lt1"/>
-            </a:fontRef>
-          </p:style>
-          <p:txBody>
-            <a:bodyPr vert="horz" wrap="none" lIns="91440" tIns="45720" rIns="91440" bIns="45720" numCol="1" rtlCol="0" anchor="ctr" anchorCtr="0" compatLnSpc="1">
-              <a:prstTxWarp prst="textNoShape">
-                <a:avLst/>
-              </a:prstTxWarp>
-              <a:noAutofit/>
-            </a:bodyPr>
-            <a:lstStyle/>
-            <a:p>
-              <a:pPr marL="342900" indent="-342900" algn="ctr" fontAlgn="base">
-                <a:lnSpc>
-                  <a:spcPct val="80000"/>
-                </a:lnSpc>
-                <a:spcBef>
-                  <a:spcPct val="20000"/>
-                </a:spcBef>
-                <a:spcAft>
-                  <a:spcPct val="0"/>
-                </a:spcAft>
-                <a:buClr>
-                  <a:schemeClr val="hlink"/>
-                </a:buClr>
-                <a:buSzPct val="60000"/>
-              </a:pPr>
-              <a:r>
-                <a:rPr lang="en-CA" sz="2000" dirty="0" smtClean="0"/>
-                <a:t>Live Source</a:t>
-              </a:r>
-              <a:endParaRPr kumimoji="0" lang="en-CA" sz="2000" i="0" u="none" strike="noStrike" cap="none" normalizeH="0" baseline="0" dirty="0" smtClean="0">
-                <a:ln>
-                  <a:noFill/>
-                </a:ln>
-                <a:solidFill>
-                  <a:schemeClr val="tx1"/>
-                </a:solidFill>
-                <a:effectLst/>
-                <a:latin typeface="Arial" charset="0"/>
-              </a:endParaRPr>
-            </a:p>
-          </p:txBody>
-        </p:sp>
-        <p:sp>
-          <p:nvSpPr>
-            <p:cNvPr id="27" name="Rectangle 26"/>
-            <p:cNvSpPr/>
-            <p:nvPr/>
-          </p:nvSpPr>
-          <p:spPr bwMode="auto">
-            <a:xfrm>
-              <a:off x="1985815" y="3399984"/>
-              <a:ext cx="2682778" cy="523321"/>
-            </a:xfrm>
-            <a:prstGeom prst="rect">
-              <a:avLst/>
-            </a:prstGeom>
-            <a:solidFill>
-              <a:schemeClr val="accent1">
-                <a:lumMod val="75000"/>
-              </a:schemeClr>
-            </a:solidFill>
-            <a:ln>
-              <a:headEnd type="none" w="med" len="med"/>
-              <a:tailEnd type="none" w="med" len="med"/>
-            </a:ln>
-          </p:spPr>
-          <p:style>
-            <a:lnRef idx="0">
-              <a:schemeClr val="accent6"/>
-            </a:lnRef>
-            <a:fillRef idx="3">
-              <a:schemeClr val="accent6"/>
-            </a:fillRef>
-            <a:effectRef idx="3">
-              <a:schemeClr val="accent6"/>
-            </a:effectRef>
-            <a:fontRef idx="minor">
-              <a:schemeClr val="lt1"/>
-            </a:fontRef>
-          </p:style>
-          <p:txBody>
-            <a:bodyPr vert="horz" wrap="none" lIns="91440" tIns="45720" rIns="91440" bIns="45720" numCol="1" rtlCol="0" anchor="ctr" anchorCtr="0" compatLnSpc="1">
-              <a:prstTxWarp prst="textNoShape">
-                <a:avLst/>
-              </a:prstTxWarp>
-              <a:noAutofit/>
-            </a:bodyPr>
-            <a:lstStyle/>
-            <a:p>
-              <a:pPr marL="342900" indent="-342900" algn="ctr" fontAlgn="base">
-                <a:lnSpc>
-                  <a:spcPct val="80000"/>
-                </a:lnSpc>
-                <a:spcBef>
-                  <a:spcPct val="20000"/>
-                </a:spcBef>
-                <a:spcAft>
-                  <a:spcPct val="0"/>
-                </a:spcAft>
-                <a:buClr>
-                  <a:schemeClr val="hlink"/>
-                </a:buClr>
-                <a:buSzPct val="60000"/>
-              </a:pPr>
-              <a:r>
-                <a:rPr lang="en-CA" sz="2000" smtClean="0"/>
-                <a:t>Receiving Device</a:t>
-              </a:r>
-              <a:endParaRPr kumimoji="0" lang="en-CA" sz="2000" i="0" u="none" strike="noStrike" cap="none" normalizeH="0" baseline="0" dirty="0" smtClean="0">
-                <a:ln>
-                  <a:noFill/>
-                </a:ln>
-                <a:solidFill>
-                  <a:schemeClr val="tx1"/>
-                </a:solidFill>
-                <a:effectLst/>
-                <a:latin typeface="Arial" charset="0"/>
-              </a:endParaRPr>
-            </a:p>
-          </p:txBody>
-        </p:sp>
-        <p:sp>
-          <p:nvSpPr>
-            <p:cNvPr id="11" name="U-Turn Arrow 10"/>
-            <p:cNvSpPr/>
-            <p:nvPr/>
-          </p:nvSpPr>
-          <p:spPr>
-            <a:xfrm rot="5400000">
-              <a:off x="4831228" y="2288234"/>
-              <a:ext cx="727642" cy="751114"/>
-            </a:xfrm>
-            <a:prstGeom prst="uturnArrow">
-              <a:avLst/>
-            </a:prstGeom>
-          </p:spPr>
-          <p:style>
-            <a:lnRef idx="2">
-              <a:schemeClr val="accent1">
-                <a:shade val="50000"/>
-              </a:schemeClr>
-            </a:lnRef>
-            <a:fillRef idx="1">
+            <a:fillRef idx="0">
               <a:schemeClr val="accent1"/>
             </a:fillRef>
             <a:effectRef idx="0">
               <a:schemeClr val="accent1"/>
             </a:effectRef>
             <a:fontRef idx="minor">
-              <a:schemeClr val="lt1"/>
+              <a:schemeClr val="tx1"/>
             </a:fontRef>
           </p:style>
           <p:txBody>
@@ -4103,275 +4382,11 @@
             <a:lstStyle/>
             <a:p>
               <a:pPr algn="ctr"/>
-              <a:endParaRPr lang="en-US">
-                <a:solidFill>
-                  <a:schemeClr val="tx1"/>
-                </a:solidFill>
-              </a:endParaRPr>
-            </a:p>
-          </p:txBody>
-        </p:sp>
-        <p:sp>
-          <p:nvSpPr>
-            <p:cNvPr id="35" name="U-Turn Arrow 34"/>
-            <p:cNvSpPr/>
-            <p:nvPr/>
-          </p:nvSpPr>
-          <p:spPr>
-            <a:xfrm rot="5400000">
-              <a:off x="4831228" y="3058358"/>
-              <a:ext cx="727642" cy="751114"/>
-            </a:xfrm>
-            <a:prstGeom prst="uturnArrow">
-              <a:avLst/>
-            </a:prstGeom>
-          </p:spPr>
-          <p:style>
-            <a:lnRef idx="2">
-              <a:schemeClr val="accent1">
-                <a:shade val="50000"/>
-              </a:schemeClr>
-            </a:lnRef>
-            <a:fillRef idx="1">
-              <a:schemeClr val="accent1"/>
-            </a:fillRef>
-            <a:effectRef idx="0">
-              <a:schemeClr val="accent1"/>
-            </a:effectRef>
-            <a:fontRef idx="minor">
-              <a:schemeClr val="lt1"/>
-            </a:fontRef>
-          </p:style>
-          <p:txBody>
-            <a:bodyPr rtlCol="0" anchor="ctr"/>
-            <a:lstStyle/>
-            <a:p>
-              <a:pPr algn="ctr"/>
-              <a:endParaRPr lang="en-US">
-                <a:solidFill>
-                  <a:schemeClr val="tx1"/>
-                </a:solidFill>
-              </a:endParaRPr>
-            </a:p>
-          </p:txBody>
-        </p:sp>
-        <p:sp>
-          <p:nvSpPr>
-            <p:cNvPr id="36" name="U-Turn Arrow 35"/>
-            <p:cNvSpPr/>
-            <p:nvPr/>
-          </p:nvSpPr>
-          <p:spPr>
-            <a:xfrm rot="5400000">
-              <a:off x="4811848" y="1520009"/>
-              <a:ext cx="727642" cy="751114"/>
-            </a:xfrm>
-            <a:prstGeom prst="uturnArrow">
-              <a:avLst/>
-            </a:prstGeom>
-          </p:spPr>
-          <p:style>
-            <a:lnRef idx="2">
-              <a:schemeClr val="accent1">
-                <a:shade val="50000"/>
-              </a:schemeClr>
-            </a:lnRef>
-            <a:fillRef idx="1">
-              <a:schemeClr val="accent1"/>
-            </a:fillRef>
-            <a:effectRef idx="0">
-              <a:schemeClr val="accent1"/>
-            </a:effectRef>
-            <a:fontRef idx="minor">
-              <a:schemeClr val="lt1"/>
-            </a:fontRef>
-          </p:style>
-          <p:txBody>
-            <a:bodyPr rtlCol="0" anchor="ctr"/>
-            <a:lstStyle/>
-            <a:p>
-              <a:pPr algn="ctr"/>
-              <a:endParaRPr lang="en-US">
-                <a:solidFill>
-                  <a:schemeClr val="tx1"/>
-                </a:solidFill>
-              </a:endParaRPr>
-            </a:p>
-          </p:txBody>
-        </p:sp>
-        <p:sp>
-          <p:nvSpPr>
-            <p:cNvPr id="37" name="U-Turn Arrow 36"/>
-            <p:cNvSpPr/>
-            <p:nvPr/>
-          </p:nvSpPr>
-          <p:spPr>
-            <a:xfrm rot="5400000">
-              <a:off x="4798435" y="755006"/>
-              <a:ext cx="727642" cy="751114"/>
-            </a:xfrm>
-            <a:prstGeom prst="uturnArrow">
-              <a:avLst/>
-            </a:prstGeom>
-          </p:spPr>
-          <p:style>
-            <a:lnRef idx="2">
-              <a:schemeClr val="accent1">
-                <a:shade val="50000"/>
-              </a:schemeClr>
-            </a:lnRef>
-            <a:fillRef idx="1">
-              <a:schemeClr val="accent1"/>
-            </a:fillRef>
-            <a:effectRef idx="0">
-              <a:schemeClr val="accent1"/>
-            </a:effectRef>
-            <a:fontRef idx="minor">
-              <a:schemeClr val="lt1"/>
-            </a:fontRef>
-          </p:style>
-          <p:txBody>
-            <a:bodyPr rtlCol="0" anchor="ctr"/>
-            <a:lstStyle/>
-            <a:p>
-              <a:pPr algn="ctr"/>
-              <a:endParaRPr lang="en-US">
-                <a:solidFill>
-                  <a:schemeClr val="tx1"/>
-                </a:solidFill>
-              </a:endParaRPr>
-            </a:p>
-          </p:txBody>
-        </p:sp>
-        <p:sp>
-          <p:nvSpPr>
-            <p:cNvPr id="38" name="TextBox 37"/>
-            <p:cNvSpPr txBox="1"/>
-            <p:nvPr/>
-          </p:nvSpPr>
-          <p:spPr>
-            <a:xfrm>
-              <a:off x="5837306" y="1690883"/>
-              <a:ext cx="4025147" cy="338554"/>
-            </a:xfrm>
-            <a:prstGeom prst="rect">
-              <a:avLst/>
-            </a:prstGeom>
-            <a:noFill/>
-          </p:spPr>
-          <p:txBody>
-            <a:bodyPr wrap="square" rtlCol="0">
-              <a:spAutoFit/>
-            </a:bodyPr>
-            <a:lstStyle/>
-            <a:p>
-              <a:r>
-                <a:rPr lang="en-CA" sz="1600" dirty="0" smtClean="0"/>
-                <a:t>SMF encapsulated UDP, RTSP etc.</a:t>
-              </a:r>
-              <a:endParaRPr lang="en-CA" sz="1600" dirty="0"/>
-            </a:p>
-          </p:txBody>
-        </p:sp>
-        <p:sp>
-          <p:nvSpPr>
-            <p:cNvPr id="39" name="TextBox 38"/>
-            <p:cNvSpPr txBox="1"/>
-            <p:nvPr/>
-          </p:nvSpPr>
-          <p:spPr>
-            <a:xfrm>
-              <a:off x="5835940" y="2460608"/>
-              <a:ext cx="4025147" cy="338554"/>
-            </a:xfrm>
-            <a:prstGeom prst="rect">
-              <a:avLst/>
-            </a:prstGeom>
-            <a:noFill/>
-          </p:spPr>
-          <p:txBody>
-            <a:bodyPr wrap="square" rtlCol="0">
-              <a:spAutoFit/>
-            </a:bodyPr>
-            <a:lstStyle/>
-            <a:p>
-              <a:r>
-                <a:rPr lang="en-CA" sz="1600" dirty="0" smtClean="0"/>
-                <a:t>SMF encapsulated UDP, RTSP etc.</a:t>
-              </a:r>
-              <a:endParaRPr lang="en-CA" sz="1600" dirty="0"/>
-            </a:p>
-          </p:txBody>
-        </p:sp>
-        <p:sp>
-          <p:nvSpPr>
-            <p:cNvPr id="40" name="TextBox 39"/>
-            <p:cNvSpPr txBox="1"/>
-            <p:nvPr/>
-          </p:nvSpPr>
-          <p:spPr>
-            <a:xfrm>
-              <a:off x="5835941" y="3170285"/>
-              <a:ext cx="4025147" cy="338554"/>
-            </a:xfrm>
-            <a:prstGeom prst="rect">
-              <a:avLst/>
-            </a:prstGeom>
-            <a:noFill/>
-          </p:spPr>
-          <p:txBody>
-            <a:bodyPr wrap="square" rtlCol="0">
-              <a:spAutoFit/>
-            </a:bodyPr>
-            <a:lstStyle/>
-            <a:p>
-              <a:r>
-                <a:rPr lang="en-CA" sz="1600" dirty="0" smtClean="0"/>
-                <a:t>UDP, RTSP etc.</a:t>
-              </a:r>
-              <a:endParaRPr lang="en-CA" sz="1600" dirty="0"/>
+              <a:endParaRPr lang="en-US"/>
             </a:p>
           </p:txBody>
         </p:sp>
       </p:grpSp>
-      <p:sp>
-        <p:nvSpPr>
-          <p:cNvPr id="4" name="Right Brace 3"/>
-          <p:cNvSpPr/>
-          <p:nvPr/>
-        </p:nvSpPr>
-        <p:spPr>
-          <a:xfrm>
-            <a:off x="9089571" y="1789219"/>
-            <a:ext cx="250372" cy="939888"/>
-          </a:xfrm>
-          <a:prstGeom prst="rightBrace">
-            <a:avLst/>
-          </a:prstGeom>
-        </p:spPr>
-        <p:style>
-          <a:lnRef idx="1">
-            <a:schemeClr val="accent1"/>
-          </a:lnRef>
-          <a:fillRef idx="0">
-            <a:schemeClr val="accent1"/>
-          </a:fillRef>
-          <a:effectRef idx="0">
-            <a:schemeClr val="accent1"/>
-          </a:effectRef>
-          <a:fontRef idx="minor">
-            <a:schemeClr val="tx1"/>
-          </a:fontRef>
-        </p:style>
-        <p:txBody>
-          <a:bodyPr rtlCol="0" anchor="ctr"/>
-          <a:lstStyle/>
-          <a:p>
-            <a:pPr algn="ctr"/>
-            <a:endParaRPr lang="en-US"/>
-          </a:p>
-        </p:txBody>
-      </p:sp>
     </p:spTree>
     <p:extLst>
       <p:ext uri="{BB962C8B-B14F-4D97-AF65-F5344CB8AC3E}">

</xml_diff>